<commit_message>
Add powerpoint to dice-golem-2
</commit_message>
<xml_diff>
--- a/little-language/dice-golem-2/little-language.pptx
+++ b/little-language/dice-golem-2/little-language.pptx
@@ -4220,7 +4220,7 @@
                 <a:latin typeface="Courier New"/>
                 <a:cs typeface="Courier New"/>
               </a:rPr>
-              <a:t> </a:t>
+              <a:t> add | </a:t>
             </a:r>
             <a:r>
               <a:rPr lang="en-US" sz="1600" dirty="0" err="1">
@@ -4234,7 +4234,21 @@
                 <a:latin typeface="Courier New"/>
                 <a:cs typeface="Courier New"/>
               </a:rPr>
-              <a:t> | </a:t>
+              <a:t> </a:t>
+            </a:r>
+            <a:r>
+              <a:rPr lang="en-US" sz="1600" b="1" dirty="0">
+                <a:latin typeface="Courier New"/>
+                <a:cs typeface="Courier New"/>
+              </a:rPr>
+              <a:t>–</a:t>
+            </a:r>
+            <a:r>
+              <a:rPr lang="en-US" sz="1600" dirty="0">
+                <a:latin typeface="Courier New"/>
+                <a:cs typeface="Courier New"/>
+              </a:rPr>
+              <a:t> add | </a:t>
             </a:r>
             <a:r>
               <a:rPr lang="en-US" sz="1600" dirty="0" err="1">
@@ -4243,6 +4257,39 @@
               </a:rPr>
               <a:t>mult</a:t>
             </a:r>
+            <a:endParaRPr lang="en-US" sz="1600" dirty="0">
+              <a:latin typeface="Courier New"/>
+              <a:cs typeface="Courier New"/>
+            </a:endParaRPr>
+          </a:p>
+          <a:p>
+            <a:pPr marL="0" indent="0">
+              <a:lnSpc>
+                <a:spcPct val="0"/>
+              </a:lnSpc>
+              <a:buNone/>
+            </a:pPr>
+            <a:r>
+              <a:rPr lang="en-US" sz="1600" dirty="0" err="1">
+                <a:latin typeface="Courier New"/>
+                <a:cs typeface="Courier New"/>
+              </a:rPr>
+              <a:t>mult</a:t>
+            </a:r>
+            <a:r>
+              <a:rPr lang="en-US" sz="1600" dirty="0">
+                <a:latin typeface="Courier New"/>
+                <a:cs typeface="Courier New"/>
+              </a:rPr>
+              <a:t>             -&gt; </a:t>
+            </a:r>
+            <a:r>
+              <a:rPr lang="en-US" sz="1600" dirty="0" err="1">
+                <a:latin typeface="Courier New"/>
+                <a:cs typeface="Courier New"/>
+              </a:rPr>
+              <a:t>paren</a:t>
+            </a:r>
             <a:r>
               <a:rPr lang="en-US" sz="1600" dirty="0">
                 <a:latin typeface="Courier New"/>
@@ -4255,7 +4302,7 @@
                 <a:latin typeface="Courier New"/>
                 <a:cs typeface="Courier New"/>
               </a:rPr>
-              <a:t>–</a:t>
+              <a:t>*</a:t>
             </a:r>
             <a:r>
               <a:rPr lang="en-US" sz="1600" dirty="0">
@@ -4283,110 +4330,35 @@
                 <a:latin typeface="Courier New"/>
                 <a:cs typeface="Courier New"/>
               </a:rPr>
-              <a:t>mult</a:t>
-            </a:r>
-            <a:endParaRPr lang="en-US" sz="1600" dirty="0">
-              <a:latin typeface="Courier New"/>
-              <a:cs typeface="Courier New"/>
-            </a:endParaRPr>
-          </a:p>
-          <a:p>
-            <a:pPr marL="0" indent="0">
-              <a:lnSpc>
-                <a:spcPct val="0"/>
-              </a:lnSpc>
-              <a:buNone/>
-            </a:pPr>
+              <a:t>paren</a:t>
+            </a:r>
+            <a:r>
+              <a:rPr lang="en-US" sz="1600" dirty="0">
+                <a:latin typeface="Courier New"/>
+                <a:cs typeface="Courier New"/>
+              </a:rPr>
+              <a:t> </a:t>
+            </a:r>
+            <a:r>
+              <a:rPr lang="en-US" sz="1600" b="1" dirty="0">
+                <a:latin typeface="Courier New"/>
+                <a:cs typeface="Courier New"/>
+              </a:rPr>
+              <a:t>/</a:t>
+            </a:r>
+            <a:r>
+              <a:rPr lang="en-US" sz="1600" dirty="0">
+                <a:latin typeface="Courier New"/>
+                <a:cs typeface="Courier New"/>
+              </a:rPr>
+              <a:t> </a:t>
+            </a:r>
             <a:r>
               <a:rPr lang="en-US" sz="1600" dirty="0" err="1">
                 <a:latin typeface="Courier New"/>
                 <a:cs typeface="Courier New"/>
               </a:rPr>
               <a:t>mult</a:t>
-            </a:r>
-            <a:r>
-              <a:rPr lang="en-US" sz="1600" dirty="0">
-                <a:latin typeface="Courier New"/>
-                <a:cs typeface="Courier New"/>
-              </a:rPr>
-              <a:t>             -&gt; </a:t>
-            </a:r>
-            <a:r>
-              <a:rPr lang="en-US" sz="1600" dirty="0" err="1">
-                <a:latin typeface="Courier New"/>
-                <a:cs typeface="Courier New"/>
-              </a:rPr>
-              <a:t>paren</a:t>
-            </a:r>
-            <a:r>
-              <a:rPr lang="en-US" sz="1600" dirty="0">
-                <a:latin typeface="Courier New"/>
-                <a:cs typeface="Courier New"/>
-              </a:rPr>
-              <a:t> </a:t>
-            </a:r>
-            <a:r>
-              <a:rPr lang="en-US" sz="1600" b="1" dirty="0">
-                <a:latin typeface="Courier New"/>
-                <a:cs typeface="Courier New"/>
-              </a:rPr>
-              <a:t>*</a:t>
-            </a:r>
-            <a:r>
-              <a:rPr lang="en-US" sz="1600" dirty="0">
-                <a:latin typeface="Courier New"/>
-                <a:cs typeface="Courier New"/>
-              </a:rPr>
-              <a:t> </a:t>
-            </a:r>
-            <a:r>
-              <a:rPr lang="en-US" sz="1600" dirty="0" err="1">
-                <a:latin typeface="Courier New"/>
-                <a:cs typeface="Courier New"/>
-              </a:rPr>
-              <a:t>paren</a:t>
-            </a:r>
-            <a:r>
-              <a:rPr lang="en-US" sz="1600" dirty="0">
-                <a:latin typeface="Courier New"/>
-                <a:cs typeface="Courier New"/>
-              </a:rPr>
-              <a:t> | </a:t>
-            </a:r>
-            <a:r>
-              <a:rPr lang="en-US" sz="1600" dirty="0" err="1">
-                <a:latin typeface="Courier New"/>
-                <a:cs typeface="Courier New"/>
-              </a:rPr>
-              <a:t>paren</a:t>
-            </a:r>
-            <a:r>
-              <a:rPr lang="en-US" sz="1600" dirty="0">
-                <a:latin typeface="Courier New"/>
-                <a:cs typeface="Courier New"/>
-              </a:rPr>
-              <a:t> </a:t>
-            </a:r>
-            <a:r>
-              <a:rPr lang="en-US" sz="1600" b="1" dirty="0">
-                <a:latin typeface="Courier New"/>
-                <a:cs typeface="Courier New"/>
-              </a:rPr>
-              <a:t>/</a:t>
-            </a:r>
-            <a:r>
-              <a:rPr lang="en-US" sz="1600" dirty="0">
-                <a:latin typeface="Courier New"/>
-                <a:cs typeface="Courier New"/>
-              </a:rPr>
-              <a:t> </a:t>
-            </a:r>
-            <a:r>
-              <a:rPr lang="en-US" sz="1600" dirty="0" err="1">
-                <a:latin typeface="Courier New"/>
-                <a:cs typeface="Courier New"/>
-              </a:rPr>
-              <a:t>paren</a:t>
             </a:r>
             <a:r>
               <a:rPr lang="en-US" sz="1600" dirty="0">

</xml_diff>